<commit_message>
updated template of product roadmap
</commit_message>
<xml_diff>
--- a/assets/files/product-mgt-fw/TEMPLATE - Product Roadmap - Executive View.pptx
+++ b/assets/files/product-mgt-fw/TEMPLATE - Product Roadmap - Executive View.pptx
@@ -5774,7 +5774,7 @@
           <p:nvPr userDrawn="1">
             <p:extLst>
               <p:ext uri="{1162E1C5-73C7-4A58-AE30-91384D911F3F}">
-                <p184:classification xmlns:p184="http://schemas.microsoft.com/office/powerpoint/2018/4/main" xmlns="" val="ftr"/>
+                <p184:classification xmlns="" xmlns:p184="http://schemas.microsoft.com/office/powerpoint/2018/4/main" val="ftr"/>
               </p:ext>
             </p:extLst>
           </p:nvPr>
@@ -6311,7 +6311,7 @@
           <p:nvPr>
             <p:extLst>
               <p:ext uri="{1162E1C5-73C7-4A58-AE30-91384D911F3F}">
-                <p184:classification xmlns:p184="http://schemas.microsoft.com/office/powerpoint/2018/4/main" xmlns="" val="ftr"/>
+                <p184:classification xmlns="" xmlns:p184="http://schemas.microsoft.com/office/powerpoint/2018/4/main" val="ftr"/>
               </p:ext>
             </p:extLst>
           </p:nvPr>
@@ -7005,6 +7005,93 @@
           </a:p>
         </p:txBody>
       </p:sp>
+      <p:grpSp>
+        <p:nvGrpSpPr>
+          <p:cNvPr id="6" name="Group 5"/>
+          <p:cNvGrpSpPr/>
+          <p:nvPr/>
+        </p:nvGrpSpPr>
+        <p:grpSpPr>
+          <a:xfrm>
+            <a:off x="10957560" y="-32177"/>
+            <a:ext cx="1234440" cy="1579037"/>
+            <a:chOff x="10957560" y="-32177"/>
+            <a:chExt cx="1234440" cy="1579037"/>
+          </a:xfrm>
+        </p:grpSpPr>
+        <p:sp>
+          <p:nvSpPr>
+            <p:cNvPr id="7" name="Diagonal Stripe 6"/>
+            <p:cNvSpPr/>
+            <p:nvPr/>
+          </p:nvSpPr>
+          <p:spPr>
+            <a:xfrm rot="5400000">
+              <a:off x="10801350" y="156210"/>
+              <a:ext cx="1546860" cy="1234440"/>
+            </a:xfrm>
+            <a:prstGeom prst="diagStripe">
+              <a:avLst/>
+            </a:prstGeom>
+          </p:spPr>
+          <p:style>
+            <a:lnRef idx="1">
+              <a:schemeClr val="accent2"/>
+            </a:lnRef>
+            <a:fillRef idx="3">
+              <a:schemeClr val="accent2"/>
+            </a:fillRef>
+            <a:effectRef idx="2">
+              <a:schemeClr val="accent2"/>
+            </a:effectRef>
+            <a:fontRef idx="minor">
+              <a:schemeClr val="lt1"/>
+            </a:fontRef>
+          </p:style>
+          <p:txBody>
+            <a:bodyPr rtlCol="0" anchor="ctr"/>
+            <a:lstStyle/>
+            <a:p>
+              <a:pPr algn="ctr"/>
+              <a:endParaRPr lang="en-CA" dirty="0">
+                <a:solidFill>
+                  <a:schemeClr val="tx1"/>
+                </a:solidFill>
+              </a:endParaRPr>
+            </a:p>
+          </p:txBody>
+        </p:sp>
+        <p:sp>
+          <p:nvSpPr>
+            <p:cNvPr id="8" name="TextBox 7"/>
+            <p:cNvSpPr txBox="1"/>
+            <p:nvPr/>
+          </p:nvSpPr>
+          <p:spPr>
+            <a:xfrm rot="3061459">
+              <a:off x="11117273" y="400242"/>
+              <a:ext cx="1234169" cy="369332"/>
+            </a:xfrm>
+            <a:prstGeom prst="rect">
+              <a:avLst/>
+            </a:prstGeom>
+            <a:noFill/>
+          </p:spPr>
+          <p:txBody>
+            <a:bodyPr wrap="square" rtlCol="0">
+              <a:spAutoFit/>
+            </a:bodyPr>
+            <a:lstStyle/>
+            <a:p>
+              <a:r>
+                <a:rPr lang="en-CA" dirty="0" smtClean="0"/>
+                <a:t>EXAMPLES</a:t>
+              </a:r>
+              <a:endParaRPr lang="en-CA" dirty="0"/>
+            </a:p>
+          </p:txBody>
+        </p:sp>
+      </p:grpSp>
     </p:spTree>
     <p:extLst>
       <p:ext uri="{BB962C8B-B14F-4D97-AF65-F5344CB8AC3E}">
@@ -7913,6 +8000,93 @@
           </a:p>
         </p:txBody>
       </p:sp>
+      <p:grpSp>
+        <p:nvGrpSpPr>
+          <p:cNvPr id="7" name="Group 6"/>
+          <p:cNvGrpSpPr/>
+          <p:nvPr/>
+        </p:nvGrpSpPr>
+        <p:grpSpPr>
+          <a:xfrm>
+            <a:off x="10957560" y="-32177"/>
+            <a:ext cx="1234440" cy="1579037"/>
+            <a:chOff x="10957560" y="-32177"/>
+            <a:chExt cx="1234440" cy="1579037"/>
+          </a:xfrm>
+        </p:grpSpPr>
+        <p:sp>
+          <p:nvSpPr>
+            <p:cNvPr id="5" name="Diagonal Stripe 4"/>
+            <p:cNvSpPr/>
+            <p:nvPr/>
+          </p:nvSpPr>
+          <p:spPr>
+            <a:xfrm rot="5400000">
+              <a:off x="10801350" y="156210"/>
+              <a:ext cx="1546860" cy="1234440"/>
+            </a:xfrm>
+            <a:prstGeom prst="diagStripe">
+              <a:avLst/>
+            </a:prstGeom>
+          </p:spPr>
+          <p:style>
+            <a:lnRef idx="1">
+              <a:schemeClr val="accent2"/>
+            </a:lnRef>
+            <a:fillRef idx="3">
+              <a:schemeClr val="accent2"/>
+            </a:fillRef>
+            <a:effectRef idx="2">
+              <a:schemeClr val="accent2"/>
+            </a:effectRef>
+            <a:fontRef idx="minor">
+              <a:schemeClr val="lt1"/>
+            </a:fontRef>
+          </p:style>
+          <p:txBody>
+            <a:bodyPr rtlCol="0" anchor="ctr"/>
+            <a:lstStyle/>
+            <a:p>
+              <a:pPr algn="ctr"/>
+              <a:endParaRPr lang="en-CA" dirty="0">
+                <a:solidFill>
+                  <a:schemeClr val="tx1"/>
+                </a:solidFill>
+              </a:endParaRPr>
+            </a:p>
+          </p:txBody>
+        </p:sp>
+        <p:sp>
+          <p:nvSpPr>
+            <p:cNvPr id="6" name="TextBox 5"/>
+            <p:cNvSpPr txBox="1"/>
+            <p:nvPr/>
+          </p:nvSpPr>
+          <p:spPr>
+            <a:xfrm rot="3061459">
+              <a:off x="11117273" y="400242"/>
+              <a:ext cx="1234169" cy="369332"/>
+            </a:xfrm>
+            <a:prstGeom prst="rect">
+              <a:avLst/>
+            </a:prstGeom>
+            <a:noFill/>
+          </p:spPr>
+          <p:txBody>
+            <a:bodyPr wrap="square" rtlCol="0">
+              <a:spAutoFit/>
+            </a:bodyPr>
+            <a:lstStyle/>
+            <a:p>
+              <a:r>
+                <a:rPr lang="en-CA" dirty="0" smtClean="0"/>
+                <a:t>EXAMPLES</a:t>
+              </a:r>
+              <a:endParaRPr lang="en-CA" dirty="0"/>
+            </a:p>
+          </p:txBody>
+        </p:sp>
+      </p:grpSp>
     </p:spTree>
     <p:extLst>
       <p:ext uri="{BB962C8B-B14F-4D97-AF65-F5344CB8AC3E}">
@@ -8643,7 +8817,7 @@
           <a:blip r:embed="rId4">
             <a:extLst>
               <a:ext uri="{96DAC541-7B7A-43D3-8B79-37D633B846F1}">
-                <asvg:svgBlip xmlns:asvg="http://schemas.microsoft.com/office/drawing/2016/SVG/main" xmlns="" r:embed="rId5"/>
+                <asvg:svgBlip xmlns="" xmlns:asvg="http://schemas.microsoft.com/office/drawing/2016/SVG/main" r:embed="rId5"/>
               </a:ext>
             </a:extLst>
           </a:blip>
@@ -8679,7 +8853,7 @@
           <a:blip r:embed="rId6">
             <a:extLst>
               <a:ext uri="{96DAC541-7B7A-43D3-8B79-37D633B846F1}">
-                <asvg:svgBlip xmlns:asvg="http://schemas.microsoft.com/office/drawing/2016/SVG/main" xmlns="" r:embed="rId7"/>
+                <asvg:svgBlip xmlns="" xmlns:asvg="http://schemas.microsoft.com/office/drawing/2016/SVG/main" r:embed="rId7"/>
               </a:ext>
             </a:extLst>
           </a:blip>
@@ -8785,7 +8959,7 @@
           <a:blip r:embed="rId4">
             <a:extLst>
               <a:ext uri="{96DAC541-7B7A-43D3-8B79-37D633B846F1}">
-                <asvg:svgBlip xmlns:asvg="http://schemas.microsoft.com/office/drawing/2016/SVG/main" xmlns="" r:embed="rId5"/>
+                <asvg:svgBlip xmlns="" xmlns:asvg="http://schemas.microsoft.com/office/drawing/2016/SVG/main" r:embed="rId5"/>
               </a:ext>
             </a:extLst>
           </a:blip>
@@ -8821,7 +8995,7 @@
           <a:blip r:embed="rId6">
             <a:extLst>
               <a:ext uri="{96DAC541-7B7A-43D3-8B79-37D633B846F1}">
-                <asvg:svgBlip xmlns:asvg="http://schemas.microsoft.com/office/drawing/2016/SVG/main" xmlns="" r:embed="rId7"/>
+                <asvg:svgBlip xmlns="" xmlns:asvg="http://schemas.microsoft.com/office/drawing/2016/SVG/main" r:embed="rId7"/>
               </a:ext>
             </a:extLst>
           </a:blip>
@@ -9039,6 +9213,93 @@
           </a:fontRef>
         </p:style>
       </p:cxnSp>
+      <p:grpSp>
+        <p:nvGrpSpPr>
+          <p:cNvPr id="32" name="Group 31"/>
+          <p:cNvGrpSpPr/>
+          <p:nvPr/>
+        </p:nvGrpSpPr>
+        <p:grpSpPr>
+          <a:xfrm>
+            <a:off x="10957560" y="-32177"/>
+            <a:ext cx="1234440" cy="1579037"/>
+            <a:chOff x="10957560" y="-32177"/>
+            <a:chExt cx="1234440" cy="1579037"/>
+          </a:xfrm>
+        </p:grpSpPr>
+        <p:sp>
+          <p:nvSpPr>
+            <p:cNvPr id="34" name="Diagonal Stripe 33"/>
+            <p:cNvSpPr/>
+            <p:nvPr/>
+          </p:nvSpPr>
+          <p:spPr>
+            <a:xfrm rot="5400000">
+              <a:off x="10801350" y="156210"/>
+              <a:ext cx="1546860" cy="1234440"/>
+            </a:xfrm>
+            <a:prstGeom prst="diagStripe">
+              <a:avLst/>
+            </a:prstGeom>
+          </p:spPr>
+          <p:style>
+            <a:lnRef idx="1">
+              <a:schemeClr val="accent2"/>
+            </a:lnRef>
+            <a:fillRef idx="3">
+              <a:schemeClr val="accent2"/>
+            </a:fillRef>
+            <a:effectRef idx="2">
+              <a:schemeClr val="accent2"/>
+            </a:effectRef>
+            <a:fontRef idx="minor">
+              <a:schemeClr val="lt1"/>
+            </a:fontRef>
+          </p:style>
+          <p:txBody>
+            <a:bodyPr rtlCol="0" anchor="ctr"/>
+            <a:lstStyle/>
+            <a:p>
+              <a:pPr algn="ctr"/>
+              <a:endParaRPr lang="en-CA" dirty="0">
+                <a:solidFill>
+                  <a:schemeClr val="tx1"/>
+                </a:solidFill>
+              </a:endParaRPr>
+            </a:p>
+          </p:txBody>
+        </p:sp>
+        <p:sp>
+          <p:nvSpPr>
+            <p:cNvPr id="35" name="TextBox 34"/>
+            <p:cNvSpPr txBox="1"/>
+            <p:nvPr/>
+          </p:nvSpPr>
+          <p:spPr>
+            <a:xfrm rot="3061459">
+              <a:off x="11117273" y="400242"/>
+              <a:ext cx="1234169" cy="369332"/>
+            </a:xfrm>
+            <a:prstGeom prst="rect">
+              <a:avLst/>
+            </a:prstGeom>
+            <a:noFill/>
+          </p:spPr>
+          <p:txBody>
+            <a:bodyPr wrap="square" rtlCol="0">
+              <a:spAutoFit/>
+            </a:bodyPr>
+            <a:lstStyle/>
+            <a:p>
+              <a:r>
+                <a:rPr lang="en-CA" dirty="0" smtClean="0"/>
+                <a:t>EXAMPLES</a:t>
+              </a:r>
+              <a:endParaRPr lang="en-CA" dirty="0"/>
+            </a:p>
+          </p:txBody>
+        </p:sp>
+      </p:grpSp>
     </p:spTree>
     <p:extLst>
       <p:ext uri="{BB962C8B-B14F-4D97-AF65-F5344CB8AC3E}">
@@ -9258,7 +9519,7 @@
           <p:nvPr>
             <p:extLst>
               <p:ext uri="{D42A27DB-BD31-4B8C-83A1-F6EECF244321}">
-                <p14:modId xmlns:p14="http://schemas.microsoft.com/office/powerpoint/2010/main" val="1766466387"/>
+                <p14:modId xmlns:p14="http://schemas.microsoft.com/office/powerpoint/2010/main" val="3204285512"/>
               </p:ext>
             </p:extLst>
           </p:nvPr>
@@ -11017,6 +11278,36 @@
                     <a:p>
                       <a:pPr algn="l" fontAlgn="b"/>
                       <a:r>
+                        <a:rPr lang="en-CA" sz="1600" b="0" i="0" u="none" strike="noStrike" dirty="0" smtClean="0">
+                          <a:solidFill>
+                            <a:srgbClr val="000000"/>
+                          </a:solidFill>
+                          <a:effectLst/>
+                          <a:latin typeface="+mn-lt"/>
+                        </a:rPr>
+                        <a:t>Escaped High</a:t>
+                      </a:r>
+                      <a:r>
+                        <a:rPr lang="en-CA" sz="1600" b="0" i="0" u="none" strike="noStrike" baseline="0" dirty="0" smtClean="0">
+                          <a:solidFill>
+                            <a:srgbClr val="000000"/>
+                          </a:solidFill>
+                          <a:effectLst/>
+                          <a:latin typeface="+mn-lt"/>
+                        </a:rPr>
+                        <a:t> Impact</a:t>
+                      </a:r>
+                      <a:r>
+                        <a:rPr lang="en-CA" sz="1600" b="0" i="0" u="none" strike="noStrike" dirty="0" smtClean="0">
+                          <a:solidFill>
+                            <a:srgbClr val="000000"/>
+                          </a:solidFill>
+                          <a:effectLst/>
+                          <a:latin typeface="+mn-lt"/>
+                        </a:rPr>
+                        <a:t> </a:t>
+                      </a:r>
+                      <a:r>
                         <a:rPr lang="en-CA" sz="1600" b="0" i="0" u="none" strike="noStrike" dirty="0">
                           <a:solidFill>
                             <a:srgbClr val="000000"/>
@@ -11024,7 +11315,7 @@
                           <a:effectLst/>
                           <a:latin typeface="+mn-lt"/>
                         </a:rPr>
-                        <a:t>Escaped Defects</a:t>
+                        <a:t>Defects</a:t>
                       </a:r>
                     </a:p>
                   </a:txBody>
@@ -11404,11 +11695,14 @@
                     <a:p>
                       <a:pPr algn="r" fontAlgn="b"/>
                       <a:r>
-                        <a:rPr lang="en-CA" sz="1600" u="none" strike="noStrike" dirty="0">
+                        <a:rPr lang="en-CA" sz="1600" b="0" i="0" u="none" strike="noStrike" dirty="0" smtClean="0">
+                          <a:solidFill>
+                            <a:srgbClr val="000000"/>
+                          </a:solidFill>
                           <a:effectLst/>
                           <a:latin typeface="+mn-lt"/>
                         </a:rPr>
-                        <a:t>4</a:t>
+                        <a:t>1</a:t>
                       </a:r>
                       <a:endParaRPr lang="en-CA" sz="1600" b="0" i="0" u="none" strike="noStrike" dirty="0">
                         <a:solidFill>
@@ -12271,6 +12565,93 @@
           </a:p>
         </p:txBody>
       </p:sp>
+      <p:grpSp>
+        <p:nvGrpSpPr>
+          <p:cNvPr id="13" name="Group 12"/>
+          <p:cNvGrpSpPr/>
+          <p:nvPr/>
+        </p:nvGrpSpPr>
+        <p:grpSpPr>
+          <a:xfrm>
+            <a:off x="10957560" y="-32177"/>
+            <a:ext cx="1234440" cy="1579037"/>
+            <a:chOff x="10957560" y="-32177"/>
+            <a:chExt cx="1234440" cy="1579037"/>
+          </a:xfrm>
+        </p:grpSpPr>
+        <p:sp>
+          <p:nvSpPr>
+            <p:cNvPr id="14" name="Diagonal Stripe 13"/>
+            <p:cNvSpPr/>
+            <p:nvPr/>
+          </p:nvSpPr>
+          <p:spPr>
+            <a:xfrm rot="5400000">
+              <a:off x="10801350" y="156210"/>
+              <a:ext cx="1546860" cy="1234440"/>
+            </a:xfrm>
+            <a:prstGeom prst="diagStripe">
+              <a:avLst/>
+            </a:prstGeom>
+          </p:spPr>
+          <p:style>
+            <a:lnRef idx="1">
+              <a:schemeClr val="accent2"/>
+            </a:lnRef>
+            <a:fillRef idx="3">
+              <a:schemeClr val="accent2"/>
+            </a:fillRef>
+            <a:effectRef idx="2">
+              <a:schemeClr val="accent2"/>
+            </a:effectRef>
+            <a:fontRef idx="minor">
+              <a:schemeClr val="lt1"/>
+            </a:fontRef>
+          </p:style>
+          <p:txBody>
+            <a:bodyPr rtlCol="0" anchor="ctr"/>
+            <a:lstStyle/>
+            <a:p>
+              <a:pPr algn="ctr"/>
+              <a:endParaRPr lang="en-CA" dirty="0">
+                <a:solidFill>
+                  <a:schemeClr val="tx1"/>
+                </a:solidFill>
+              </a:endParaRPr>
+            </a:p>
+          </p:txBody>
+        </p:sp>
+        <p:sp>
+          <p:nvSpPr>
+            <p:cNvPr id="15" name="TextBox 14"/>
+            <p:cNvSpPr txBox="1"/>
+            <p:nvPr/>
+          </p:nvSpPr>
+          <p:spPr>
+            <a:xfrm rot="3061459">
+              <a:off x="11117273" y="400242"/>
+              <a:ext cx="1234169" cy="369332"/>
+            </a:xfrm>
+            <a:prstGeom prst="rect">
+              <a:avLst/>
+            </a:prstGeom>
+            <a:noFill/>
+          </p:spPr>
+          <p:txBody>
+            <a:bodyPr wrap="square" rtlCol="0">
+              <a:spAutoFit/>
+            </a:bodyPr>
+            <a:lstStyle/>
+            <a:p>
+              <a:r>
+                <a:rPr lang="en-CA" dirty="0" smtClean="0"/>
+                <a:t>EXAMPLES</a:t>
+              </a:r>
+              <a:endParaRPr lang="en-CA" dirty="0"/>
+            </a:p>
+          </p:txBody>
+        </p:sp>
+      </p:grpSp>
     </p:spTree>
     <p:extLst>
       <p:ext uri="{BB962C8B-B14F-4D97-AF65-F5344CB8AC3E}">
@@ -12924,6 +13305,93 @@
           </a:p>
         </p:txBody>
       </p:sp>
+      <p:grpSp>
+        <p:nvGrpSpPr>
+          <p:cNvPr id="5" name="Group 4"/>
+          <p:cNvGrpSpPr/>
+          <p:nvPr/>
+        </p:nvGrpSpPr>
+        <p:grpSpPr>
+          <a:xfrm>
+            <a:off x="10957560" y="-32177"/>
+            <a:ext cx="1234440" cy="1579037"/>
+            <a:chOff x="10957560" y="-32177"/>
+            <a:chExt cx="1234440" cy="1579037"/>
+          </a:xfrm>
+        </p:grpSpPr>
+        <p:sp>
+          <p:nvSpPr>
+            <p:cNvPr id="7" name="Diagonal Stripe 6"/>
+            <p:cNvSpPr/>
+            <p:nvPr/>
+          </p:nvSpPr>
+          <p:spPr>
+            <a:xfrm rot="5400000">
+              <a:off x="10801350" y="156210"/>
+              <a:ext cx="1546860" cy="1234440"/>
+            </a:xfrm>
+            <a:prstGeom prst="diagStripe">
+              <a:avLst/>
+            </a:prstGeom>
+          </p:spPr>
+          <p:style>
+            <a:lnRef idx="1">
+              <a:schemeClr val="accent2"/>
+            </a:lnRef>
+            <a:fillRef idx="3">
+              <a:schemeClr val="accent2"/>
+            </a:fillRef>
+            <a:effectRef idx="2">
+              <a:schemeClr val="accent2"/>
+            </a:effectRef>
+            <a:fontRef idx="minor">
+              <a:schemeClr val="lt1"/>
+            </a:fontRef>
+          </p:style>
+          <p:txBody>
+            <a:bodyPr rtlCol="0" anchor="ctr"/>
+            <a:lstStyle/>
+            <a:p>
+              <a:pPr algn="ctr"/>
+              <a:endParaRPr lang="en-CA" dirty="0">
+                <a:solidFill>
+                  <a:schemeClr val="tx1"/>
+                </a:solidFill>
+              </a:endParaRPr>
+            </a:p>
+          </p:txBody>
+        </p:sp>
+        <p:sp>
+          <p:nvSpPr>
+            <p:cNvPr id="8" name="TextBox 7"/>
+            <p:cNvSpPr txBox="1"/>
+            <p:nvPr/>
+          </p:nvSpPr>
+          <p:spPr>
+            <a:xfrm rot="3061459">
+              <a:off x="11117273" y="400242"/>
+              <a:ext cx="1234169" cy="369332"/>
+            </a:xfrm>
+            <a:prstGeom prst="rect">
+              <a:avLst/>
+            </a:prstGeom>
+            <a:noFill/>
+          </p:spPr>
+          <p:txBody>
+            <a:bodyPr wrap="square" rtlCol="0">
+              <a:spAutoFit/>
+            </a:bodyPr>
+            <a:lstStyle/>
+            <a:p>
+              <a:r>
+                <a:rPr lang="en-CA" dirty="0" smtClean="0"/>
+                <a:t>EXAMPLES</a:t>
+              </a:r>
+              <a:endParaRPr lang="en-CA" dirty="0"/>
+            </a:p>
+          </p:txBody>
+        </p:sp>
+      </p:grpSp>
     </p:spTree>
     <p:extLst>
       <p:ext uri="{BB962C8B-B14F-4D97-AF65-F5344CB8AC3E}">
@@ -13986,6 +14454,15 @@
 </file>
 
 <file path=customXml/item2.xml><?xml version="1.0" encoding="utf-8"?>
+<?mso-contentType ?>
+<FormTemplates xmlns="http://schemas.microsoft.com/sharepoint/v3/contenttype/forms">
+  <Display>DocumentLibraryForm</Display>
+  <Edit>DocumentLibraryForm</Edit>
+  <New>DocumentLibraryForm</New>
+</FormTemplates>
+</file>
+
+<file path=customXml/item3.xml><?xml version="1.0" encoding="utf-8"?>
 <ct:contentTypeSchema xmlns:ct="http://schemas.microsoft.com/office/2006/metadata/contentType" xmlns:ma="http://schemas.microsoft.com/office/2006/metadata/properties/metaAttributes" ct:_="" ma:_="" ma:contentTypeName="Document" ma:contentTypeID="0x010100170EA69B7AC3984AAD65C86E413FAFD9" ma:contentTypeVersion="14" ma:contentTypeDescription="Crée un document." ma:contentTypeScope="" ma:versionID="b2062fe97b0100b262f66d8e102407a9">
   <xsd:schema xmlns:xsd="http://www.w3.org/2001/XMLSchema" xmlns:xs="http://www.w3.org/2001/XMLSchema" xmlns:p="http://schemas.microsoft.com/office/2006/metadata/properties" xmlns:ns2="3144a6d9-7964-46f7-a725-adb10923c81c" xmlns:ns3="1379f0b9-1a2a-45e1-8ca5-079c1a8da587" xmlns:ns4="f76aaf80-9812-406c-9dd3-ccb851cf3a75" targetNamespace="http://schemas.microsoft.com/office/2006/metadata/properties" ma:root="true" ma:fieldsID="ae07814a391ae957e1cfb0a93561a7b8" ns2:_="" ns3:_="" ns4:_="">
     <xsd:import namespace="3144a6d9-7964-46f7-a725-adb10923c81c"/>
@@ -14221,27 +14698,18 @@
 </ct:contentTypeSchema>
 </file>
 
-<file path=customXml/item3.xml><?xml version="1.0" encoding="utf-8"?>
-<?mso-contentType ?>
-<FormTemplates xmlns="http://schemas.microsoft.com/sharepoint/v3/contenttype/forms">
-  <Display>DocumentLibraryForm</Display>
-  <Edit>DocumentLibraryForm</Edit>
-  <New>DocumentLibraryForm</New>
-</FormTemplates>
-</file>
-
 <file path=customXml/itemProps1.xml><?xml version="1.0" encoding="utf-8"?>
 <ds:datastoreItem xmlns:ds="http://schemas.openxmlformats.org/officeDocument/2006/customXml" ds:itemID="{7D5E0C8D-2B00-420B-8830-D5890B9C9977}">
   <ds:schemaRefs>
-    <ds:schemaRef ds:uri="http://purl.org/dc/terms/"/>
+    <ds:schemaRef ds:uri="http://schemas.microsoft.com/office/infopath/2007/PartnerControls"/>
     <ds:schemaRef ds:uri="f76aaf80-9812-406c-9dd3-ccb851cf3a75"/>
     <ds:schemaRef ds:uri="3144a6d9-7964-46f7-a725-adb10923c81c"/>
+    <ds:schemaRef ds:uri="http://purl.org/dc/elements/1.1/"/>
+    <ds:schemaRef ds:uri="http://schemas.microsoft.com/office/2006/metadata/properties"/>
+    <ds:schemaRef ds:uri="1379f0b9-1a2a-45e1-8ca5-079c1a8da587"/>
+    <ds:schemaRef ds:uri="http://purl.org/dc/terms/"/>
+    <ds:schemaRef ds:uri="http://schemas.openxmlformats.org/package/2006/metadata/core-properties"/>
     <ds:schemaRef ds:uri="http://schemas.microsoft.com/office/2006/documentManagement/types"/>
-    <ds:schemaRef ds:uri="http://schemas.microsoft.com/office/2006/metadata/properties"/>
-    <ds:schemaRef ds:uri="http://purl.org/dc/elements/1.1/"/>
-    <ds:schemaRef ds:uri="1379f0b9-1a2a-45e1-8ca5-079c1a8da587"/>
-    <ds:schemaRef ds:uri="http://schemas.openxmlformats.org/package/2006/metadata/core-properties"/>
-    <ds:schemaRef ds:uri="http://schemas.microsoft.com/office/infopath/2007/PartnerControls"/>
     <ds:schemaRef ds:uri="http://www.w3.org/XML/1998/namespace"/>
     <ds:schemaRef ds:uri="http://purl.org/dc/dcmitype/"/>
   </ds:schemaRefs>
@@ -14249,6 +14717,14 @@
 </file>
 
 <file path=customXml/itemProps2.xml><?xml version="1.0" encoding="utf-8"?>
+<ds:datastoreItem xmlns:ds="http://schemas.openxmlformats.org/officeDocument/2006/customXml" ds:itemID="{5109D37B-B986-4B7F-99D8-986FD9D0A6BB}">
+  <ds:schemaRefs>
+    <ds:schemaRef ds:uri="http://schemas.microsoft.com/sharepoint/v3/contenttype/forms"/>
+  </ds:schemaRefs>
+</ds:datastoreItem>
+</file>
+
+<file path=customXml/itemProps3.xml><?xml version="1.0" encoding="utf-8"?>
 <ds:datastoreItem xmlns:ds="http://schemas.openxmlformats.org/officeDocument/2006/customXml" ds:itemID="{7A1EDE81-3527-494A-877F-E157AF9746CD}">
   <ds:schemaRefs>
     <ds:schemaRef ds:uri="http://schemas.microsoft.com/office/2006/metadata/contentType"/>
@@ -14266,12 +14742,4 @@
     <ds:schemaRef ds:uri="http://schemas.microsoft.com/internal/obd"/>
   </ds:schemaRefs>
 </ds:datastoreItem>
-</file>
-
-<file path=customXml/itemProps3.xml><?xml version="1.0" encoding="utf-8"?>
-<ds:datastoreItem xmlns:ds="http://schemas.openxmlformats.org/officeDocument/2006/customXml" ds:itemID="{5109D37B-B986-4B7F-99D8-986FD9D0A6BB}">
-  <ds:schemaRefs>
-    <ds:schemaRef ds:uri="http://schemas.microsoft.com/sharepoint/v3/contenttype/forms"/>
-  </ds:schemaRefs>
-</ds:datastoreItem>
 </file>
</xml_diff>